<commit_message>
Adding Tests for Adventure Works
</commit_message>
<xml_diff>
--- a/Automation/EnvironmentAutomation.pptx
+++ b/Automation/EnvironmentAutomation.pptx
@@ -5,7 +5,7 @@
     <p:sldMasterId id="2147483648" r:id="rId1"/>
   </p:sldMasterIdLst>
   <p:notesMasterIdLst>
-    <p:notesMasterId r:id="rId14"/>
+    <p:notesMasterId r:id="rId15"/>
   </p:notesMasterIdLst>
   <p:sldIdLst>
     <p:sldId id="263" r:id="rId2"/>
@@ -13,13 +13,14 @@
     <p:sldId id="264" r:id="rId4"/>
     <p:sldId id="318" r:id="rId5"/>
     <p:sldId id="319" r:id="rId6"/>
-    <p:sldId id="320" r:id="rId7"/>
-    <p:sldId id="314" r:id="rId8"/>
-    <p:sldId id="315" r:id="rId9"/>
-    <p:sldId id="316" r:id="rId10"/>
-    <p:sldId id="317" r:id="rId11"/>
-    <p:sldId id="321" r:id="rId12"/>
-    <p:sldId id="322" r:id="rId13"/>
+    <p:sldId id="323" r:id="rId7"/>
+    <p:sldId id="320" r:id="rId8"/>
+    <p:sldId id="314" r:id="rId9"/>
+    <p:sldId id="315" r:id="rId10"/>
+    <p:sldId id="316" r:id="rId11"/>
+    <p:sldId id="317" r:id="rId12"/>
+    <p:sldId id="321" r:id="rId13"/>
+    <p:sldId id="322" r:id="rId14"/>
   </p:sldIdLst>
   <p:sldSz cx="11520488" cy="6480175"/>
   <p:notesSz cx="6858000" cy="9144000"/>
@@ -9400,7 +9401,7 @@
           <a:p>
             <a:fld id="{AF914A1E-46E5-4184-BEBF-7A52F35B4545}" type="datetimeFigureOut">
               <a:rPr lang="en-US" smtClean="0"/>
-              <a:t>7/1/2019</a:t>
+              <a:t>7/27/2019</a:t>
             </a:fld>
             <a:endParaRPr lang="en-US" dirty="0"/>
           </a:p>
@@ -9999,7 +10000,7 @@
           <a:p>
             <a:fld id="{12D1A968-C0E8-4160-9441-EB3EE2D578CC}" type="slidenum">
               <a:rPr lang="en-US" smtClean="0"/>
-              <a:t>7</a:t>
+              <a:t>8</a:t>
             </a:fld>
             <a:endParaRPr lang="en-US" dirty="0"/>
           </a:p>
@@ -11032,7 +11033,7 @@
           <a:graphicData uri="http://schemas.openxmlformats.org/presentationml/2006/ole">
             <mc:AlternateContent xmlns:mc="http://schemas.openxmlformats.org/markup-compatibility/2006">
               <mc:Choice xmlns:v="urn:schemas-microsoft-com:vml" Requires="v">
-                <p:oleObj spid="_x0000_s1086" name="Image" r:id="rId10" imgW="2279520" imgH="1310400" progId="Photoshop.Image.18">
+                <p:oleObj spid="_x0000_s1088" name="Image" r:id="rId10" imgW="2279520" imgH="1310400" progId="Photoshop.Image.18">
                   <p:embed/>
                 </p:oleObj>
               </mc:Choice>
@@ -11484,6 +11485,144 @@
           <p:cNvPr id="2" name="Title 1">
             <a:extLst>
               <a:ext uri="{FF2B5EF4-FFF2-40B4-BE49-F238E27FC236}">
+                <a16:creationId xmlns:a16="http://schemas.microsoft.com/office/drawing/2014/main" id="{CF3C901D-5653-4880-971A-32EBDD5A0859}"/>
+              </a:ext>
+            </a:extLst>
+          </p:cNvPr>
+          <p:cNvSpPr>
+            <a:spLocks noGrp="1"/>
+          </p:cNvSpPr>
+          <p:nvPr>
+            <p:ph type="title"/>
+          </p:nvPr>
+        </p:nvSpPr>
+        <p:spPr/>
+        <p:txBody>
+          <a:bodyPr/>
+          <a:lstStyle/>
+          <a:p>
+            <a:r>
+              <a:rPr lang="en-US" dirty="0"/>
+              <a:t>NuGet</a:t>
+            </a:r>
+          </a:p>
+        </p:txBody>
+      </p:sp>
+      <p:sp>
+        <p:nvSpPr>
+          <p:cNvPr id="3" name="Content Placeholder 2">
+            <a:extLst>
+              <a:ext uri="{FF2B5EF4-FFF2-40B4-BE49-F238E27FC236}">
+                <a16:creationId xmlns:a16="http://schemas.microsoft.com/office/drawing/2014/main" id="{ADA832B4-E4C8-48D0-9912-741FC459B9FE}"/>
+              </a:ext>
+            </a:extLst>
+          </p:cNvPr>
+          <p:cNvSpPr>
+            <a:spLocks noGrp="1"/>
+          </p:cNvSpPr>
+          <p:nvPr>
+            <p:ph idx="1"/>
+          </p:nvPr>
+        </p:nvSpPr>
+        <p:spPr/>
+        <p:txBody>
+          <a:bodyPr/>
+          <a:lstStyle/>
+          <a:p>
+            <a:pPr marL="571500" indent="-571500">
+              <a:buFont typeface="Arial" panose="020B0604020202020204" pitchFamily="34" charset="0"/>
+              <a:buChar char="•"/>
+            </a:pPr>
+            <a:r>
+              <a:rPr lang="en-US" dirty="0"/>
+              <a:t>Single ZIP file with the .</a:t>
+            </a:r>
+            <a:r>
+              <a:rPr lang="en-US" dirty="0" err="1"/>
+              <a:t>nupkg</a:t>
+            </a:r>
+            <a:r>
+              <a:rPr lang="en-US" dirty="0"/>
+              <a:t> extension</a:t>
+            </a:r>
+          </a:p>
+          <a:p>
+            <a:pPr marL="571500" indent="-571500">
+              <a:buFont typeface="Arial" panose="020B0604020202020204" pitchFamily="34" charset="0"/>
+              <a:buChar char="•"/>
+            </a:pPr>
+            <a:r>
+              <a:rPr lang="en-US" dirty="0"/>
+              <a:t>Contains any files associated with package</a:t>
+            </a:r>
+          </a:p>
+          <a:p>
+            <a:pPr marL="571500" indent="-571500">
+              <a:buFont typeface="Arial" panose="020B0604020202020204" pitchFamily="34" charset="0"/>
+              <a:buChar char="•"/>
+            </a:pPr>
+            <a:r>
+              <a:rPr lang="en-US" dirty="0"/>
+              <a:t>Descriptive Manifest </a:t>
+            </a:r>
+          </a:p>
+          <a:p>
+            <a:pPr marL="571500" indent="-571500">
+              <a:buFont typeface="Arial" panose="020B0604020202020204" pitchFamily="34" charset="0"/>
+              <a:buChar char="•"/>
+            </a:pPr>
+            <a:r>
+              <a:rPr lang="en-US" dirty="0"/>
+              <a:t>Version Number format must be 1.0.2</a:t>
+            </a:r>
+          </a:p>
+          <a:p>
+            <a:pPr marL="571500" indent="-571500">
+              <a:buFont typeface="Arial" panose="020B0604020202020204" pitchFamily="34" charset="0"/>
+              <a:buChar char="•"/>
+            </a:pPr>
+            <a:endParaRPr lang="en-US" dirty="0"/>
+          </a:p>
+          <a:p>
+            <a:endParaRPr lang="en-US" dirty="0"/>
+          </a:p>
+        </p:txBody>
+      </p:sp>
+    </p:spTree>
+    <p:extLst>
+      <p:ext uri="{BB962C8B-B14F-4D97-AF65-F5344CB8AC3E}">
+        <p14:creationId xmlns:p14="http://schemas.microsoft.com/office/powerpoint/2010/main" val="3892061915"/>
+      </p:ext>
+    </p:extLst>
+  </p:cSld>
+  <p:clrMapOvr>
+    <a:masterClrMapping/>
+  </p:clrMapOvr>
+</p:sld>
+</file>
+
+<file path=ppt/slides/slide11.xml><?xml version="1.0" encoding="utf-8"?>
+<p:sld xmlns:a="http://schemas.openxmlformats.org/drawingml/2006/main" xmlns:r="http://schemas.openxmlformats.org/officeDocument/2006/relationships" xmlns:p="http://schemas.openxmlformats.org/presentationml/2006/main">
+  <p:cSld>
+    <p:spTree>
+      <p:nvGrpSpPr>
+        <p:cNvPr id="1" name=""/>
+        <p:cNvGrpSpPr/>
+        <p:nvPr/>
+      </p:nvGrpSpPr>
+      <p:grpSpPr>
+        <a:xfrm>
+          <a:off x="0" y="0"/>
+          <a:ext cx="0" cy="0"/>
+          <a:chOff x="0" y="0"/>
+          <a:chExt cx="0" cy="0"/>
+        </a:xfrm>
+      </p:grpSpPr>
+      <p:sp>
+        <p:nvSpPr>
+          <p:cNvPr id="2" name="Title 1">
+            <a:extLst>
+              <a:ext uri="{FF2B5EF4-FFF2-40B4-BE49-F238E27FC236}">
                 <a16:creationId xmlns:a16="http://schemas.microsoft.com/office/drawing/2014/main" id="{11EC4AEB-A1CF-43D8-A0E5-EFB1529CAC90}"/>
               </a:ext>
             </a:extLst>
@@ -11607,7 +11746,7 @@
 </p:sld>
 </file>
 
-<file path=ppt/slides/slide11.xml><?xml version="1.0" encoding="utf-8"?>
+<file path=ppt/slides/slide12.xml><?xml version="1.0" encoding="utf-8"?>
 <p:sld xmlns:a="http://schemas.openxmlformats.org/drawingml/2006/main" xmlns:r="http://schemas.openxmlformats.org/officeDocument/2006/relationships" xmlns:p="http://schemas.openxmlformats.org/presentationml/2006/main">
   <p:cSld>
     <p:spTree>
@@ -11665,7 +11804,7 @@
 </p:sld>
 </file>
 
-<file path=ppt/slides/slide12.xml><?xml version="1.0" encoding="utf-8"?>
+<file path=ppt/slides/slide13.xml><?xml version="1.0" encoding="utf-8"?>
 <p:sld xmlns:a="http://schemas.openxmlformats.org/drawingml/2006/main" xmlns:r="http://schemas.openxmlformats.org/officeDocument/2006/relationships" xmlns:p="http://schemas.openxmlformats.org/presentationml/2006/main">
   <p:cSld>
     <p:spTree>
@@ -12209,6 +12348,324 @@
           <a:chExt cx="0" cy="0"/>
         </a:xfrm>
       </p:grpSpPr>
+      <p:pic>
+        <p:nvPicPr>
+          <p:cNvPr id="3" name="Graphic 2" descr="Database">
+            <a:extLst>
+              <a:ext uri="{FF2B5EF4-FFF2-40B4-BE49-F238E27FC236}">
+                <a16:creationId xmlns:a16="http://schemas.microsoft.com/office/drawing/2014/main" id="{573C0268-B3BE-443C-8DAE-108BA612445B}"/>
+              </a:ext>
+            </a:extLst>
+          </p:cNvPr>
+          <p:cNvPicPr>
+            <a:picLocks noChangeAspect="1"/>
+          </p:cNvPicPr>
+          <p:nvPr/>
+        </p:nvPicPr>
+        <p:blipFill>
+          <a:blip r:embed="rId2">
+            <a:extLst>
+              <a:ext uri="{96DAC541-7B7A-43D3-8B79-37D633B846F1}">
+                <asvg:svgBlip xmlns:asvg="http://schemas.microsoft.com/office/drawing/2016/SVG/main" r:embed="rId3"/>
+              </a:ext>
+            </a:extLst>
+          </a:blip>
+          <a:stretch>
+            <a:fillRect/>
+          </a:stretch>
+        </p:blipFill>
+        <p:spPr>
+          <a:xfrm>
+            <a:off x="2712627" y="904160"/>
+            <a:ext cx="914400" cy="914400"/>
+          </a:xfrm>
+          <a:prstGeom prst="rect">
+            <a:avLst/>
+          </a:prstGeom>
+        </p:spPr>
+      </p:pic>
+      <p:pic>
+        <p:nvPicPr>
+          <p:cNvPr id="5" name="Graphic 4" descr="Factory">
+            <a:extLst>
+              <a:ext uri="{FF2B5EF4-FFF2-40B4-BE49-F238E27FC236}">
+                <a16:creationId xmlns:a16="http://schemas.microsoft.com/office/drawing/2014/main" id="{030859FE-C1F3-4704-A752-A4B7B39B80F7}"/>
+              </a:ext>
+            </a:extLst>
+          </p:cNvPr>
+          <p:cNvPicPr>
+            <a:picLocks noChangeAspect="1"/>
+          </p:cNvPicPr>
+          <p:nvPr/>
+        </p:nvPicPr>
+        <p:blipFill>
+          <a:blip r:embed="rId4">
+            <a:extLst>
+              <a:ext uri="{96DAC541-7B7A-43D3-8B79-37D633B846F1}">
+                <asvg:svgBlip xmlns:asvg="http://schemas.microsoft.com/office/drawing/2016/SVG/main" r:embed="rId5"/>
+              </a:ext>
+            </a:extLst>
+          </a:blip>
+          <a:stretch>
+            <a:fillRect/>
+          </a:stretch>
+        </p:blipFill>
+        <p:spPr>
+          <a:xfrm>
+            <a:off x="565414" y="1653270"/>
+            <a:ext cx="914400" cy="914400"/>
+          </a:xfrm>
+          <a:prstGeom prst="rect">
+            <a:avLst/>
+          </a:prstGeom>
+        </p:spPr>
+      </p:pic>
+      <p:pic>
+        <p:nvPicPr>
+          <p:cNvPr id="7" name="Graphic 6" descr="Open folder">
+            <a:extLst>
+              <a:ext uri="{FF2B5EF4-FFF2-40B4-BE49-F238E27FC236}">
+                <a16:creationId xmlns:a16="http://schemas.microsoft.com/office/drawing/2014/main" id="{01C14D9E-805B-4321-91E0-44B28207AB8B}"/>
+              </a:ext>
+            </a:extLst>
+          </p:cNvPr>
+          <p:cNvPicPr>
+            <a:picLocks noChangeAspect="1"/>
+          </p:cNvPicPr>
+          <p:nvPr/>
+        </p:nvPicPr>
+        <p:blipFill>
+          <a:blip r:embed="rId6">
+            <a:extLst>
+              <a:ext uri="{96DAC541-7B7A-43D3-8B79-37D633B846F1}">
+                <asvg:svgBlip xmlns:asvg="http://schemas.microsoft.com/office/drawing/2016/SVG/main" r:embed="rId7"/>
+              </a:ext>
+            </a:extLst>
+          </a:blip>
+          <a:stretch>
+            <a:fillRect/>
+          </a:stretch>
+        </p:blipFill>
+        <p:spPr>
+          <a:xfrm>
+            <a:off x="3797620" y="2567670"/>
+            <a:ext cx="914400" cy="914400"/>
+          </a:xfrm>
+          <a:prstGeom prst="rect">
+            <a:avLst/>
+          </a:prstGeom>
+        </p:spPr>
+      </p:pic>
+      <p:pic>
+        <p:nvPicPr>
+          <p:cNvPr id="9" name="Graphic 8" descr="Hierarchy">
+            <a:extLst>
+              <a:ext uri="{FF2B5EF4-FFF2-40B4-BE49-F238E27FC236}">
+                <a16:creationId xmlns:a16="http://schemas.microsoft.com/office/drawing/2014/main" id="{A8448B72-82C3-4720-9640-93C91D5ECD73}"/>
+              </a:ext>
+            </a:extLst>
+          </p:cNvPr>
+          <p:cNvPicPr>
+            <a:picLocks noChangeAspect="1"/>
+          </p:cNvPicPr>
+          <p:nvPr/>
+        </p:nvPicPr>
+        <p:blipFill>
+          <a:blip r:embed="rId8">
+            <a:extLst>
+              <a:ext uri="{96DAC541-7B7A-43D3-8B79-37D633B846F1}">
+                <asvg:svgBlip xmlns:asvg="http://schemas.microsoft.com/office/drawing/2016/SVG/main" r:embed="rId9"/>
+              </a:ext>
+            </a:extLst>
+          </a:blip>
+          <a:stretch>
+            <a:fillRect/>
+          </a:stretch>
+        </p:blipFill>
+        <p:spPr>
+          <a:xfrm>
+            <a:off x="678509" y="2649335"/>
+            <a:ext cx="914400" cy="914400"/>
+          </a:xfrm>
+          <a:prstGeom prst="rect">
+            <a:avLst/>
+          </a:prstGeom>
+        </p:spPr>
+      </p:pic>
+      <p:pic>
+        <p:nvPicPr>
+          <p:cNvPr id="11" name="Graphic 10" descr="Checklist">
+            <a:extLst>
+              <a:ext uri="{FF2B5EF4-FFF2-40B4-BE49-F238E27FC236}">
+                <a16:creationId xmlns:a16="http://schemas.microsoft.com/office/drawing/2014/main" id="{C23C493C-A49A-43BA-85D4-7921B22ABCFC}"/>
+              </a:ext>
+            </a:extLst>
+          </p:cNvPr>
+          <p:cNvPicPr>
+            <a:picLocks noChangeAspect="1"/>
+          </p:cNvPicPr>
+          <p:nvPr/>
+        </p:nvPicPr>
+        <p:blipFill>
+          <a:blip r:embed="rId10">
+            <a:extLst>
+              <a:ext uri="{96DAC541-7B7A-43D3-8B79-37D633B846F1}">
+                <asvg:svgBlip xmlns:asvg="http://schemas.microsoft.com/office/drawing/2016/SVG/main" r:embed="rId11"/>
+              </a:ext>
+            </a:extLst>
+          </a:blip>
+          <a:stretch>
+            <a:fillRect/>
+          </a:stretch>
+        </p:blipFill>
+        <p:spPr>
+          <a:xfrm>
+            <a:off x="4304831" y="1361360"/>
+            <a:ext cx="914400" cy="914400"/>
+          </a:xfrm>
+          <a:prstGeom prst="rect">
+            <a:avLst/>
+          </a:prstGeom>
+        </p:spPr>
+      </p:pic>
+      <p:pic>
+        <p:nvPicPr>
+          <p:cNvPr id="13" name="Graphic 12" descr="Social network">
+            <a:extLst>
+              <a:ext uri="{FF2B5EF4-FFF2-40B4-BE49-F238E27FC236}">
+                <a16:creationId xmlns:a16="http://schemas.microsoft.com/office/drawing/2014/main" id="{20483018-7A12-49DA-9774-85C4590AAAC2}"/>
+              </a:ext>
+            </a:extLst>
+          </p:cNvPr>
+          <p:cNvPicPr>
+            <a:picLocks noChangeAspect="1"/>
+          </p:cNvPicPr>
+          <p:nvPr/>
+        </p:nvPicPr>
+        <p:blipFill>
+          <a:blip r:embed="rId12">
+            <a:extLst>
+              <a:ext uri="{96DAC541-7B7A-43D3-8B79-37D633B846F1}">
+                <asvg:svgBlip xmlns:asvg="http://schemas.microsoft.com/office/drawing/2016/SVG/main" r:embed="rId13"/>
+              </a:ext>
+            </a:extLst>
+          </a:blip>
+          <a:stretch>
+            <a:fillRect/>
+          </a:stretch>
+        </p:blipFill>
+        <p:spPr>
+          <a:xfrm>
+            <a:off x="2557968" y="3649511"/>
+            <a:ext cx="914400" cy="914400"/>
+          </a:xfrm>
+          <a:prstGeom prst="rect">
+            <a:avLst/>
+          </a:prstGeom>
+        </p:spPr>
+      </p:pic>
+      <p:pic>
+        <p:nvPicPr>
+          <p:cNvPr id="15" name="Graphic 14" descr="Connections">
+            <a:extLst>
+              <a:ext uri="{FF2B5EF4-FFF2-40B4-BE49-F238E27FC236}">
+                <a16:creationId xmlns:a16="http://schemas.microsoft.com/office/drawing/2014/main" id="{8EF9A932-81F0-4F6E-963C-5C2278602E8B}"/>
+              </a:ext>
+            </a:extLst>
+          </p:cNvPr>
+          <p:cNvPicPr>
+            <a:picLocks noChangeAspect="1"/>
+          </p:cNvPicPr>
+          <p:nvPr/>
+        </p:nvPicPr>
+        <p:blipFill>
+          <a:blip r:embed="rId14">
+            <a:extLst>
+              <a:ext uri="{96DAC541-7B7A-43D3-8B79-37D633B846F1}">
+                <asvg:svgBlip xmlns:asvg="http://schemas.microsoft.com/office/drawing/2016/SVG/main" r:embed="rId15"/>
+              </a:ext>
+            </a:extLst>
+          </a:blip>
+          <a:stretch>
+            <a:fillRect/>
+          </a:stretch>
+        </p:blipFill>
+        <p:spPr>
+          <a:xfrm>
+            <a:off x="4845844" y="3032960"/>
+            <a:ext cx="914400" cy="914400"/>
+          </a:xfrm>
+          <a:prstGeom prst="rect">
+            <a:avLst/>
+          </a:prstGeom>
+        </p:spPr>
+      </p:pic>
+      <p:pic>
+        <p:nvPicPr>
+          <p:cNvPr id="17" name="Graphic 16" descr="Fireworks">
+            <a:extLst>
+              <a:ext uri="{FF2B5EF4-FFF2-40B4-BE49-F238E27FC236}">
+                <a16:creationId xmlns:a16="http://schemas.microsoft.com/office/drawing/2014/main" id="{1EE6AE96-026C-4B24-BF04-9621AC39F102}"/>
+              </a:ext>
+            </a:extLst>
+          </p:cNvPr>
+          <p:cNvPicPr>
+            <a:picLocks noChangeAspect="1"/>
+          </p:cNvPicPr>
+          <p:nvPr/>
+        </p:nvPicPr>
+        <p:blipFill>
+          <a:blip r:embed="rId16">
+            <a:extLst>
+              <a:ext uri="{96DAC541-7B7A-43D3-8B79-37D633B846F1}">
+                <asvg:svgBlip xmlns:asvg="http://schemas.microsoft.com/office/drawing/2016/SVG/main" r:embed="rId17"/>
+              </a:ext>
+            </a:extLst>
+          </a:blip>
+          <a:stretch>
+            <a:fillRect/>
+          </a:stretch>
+        </p:blipFill>
+        <p:spPr>
+          <a:xfrm>
+            <a:off x="9799200" y="3192311"/>
+            <a:ext cx="914400" cy="914400"/>
+          </a:xfrm>
+          <a:prstGeom prst="rect">
+            <a:avLst/>
+          </a:prstGeom>
+        </p:spPr>
+      </p:pic>
+    </p:spTree>
+    <p:extLst>
+      <p:ext uri="{BB962C8B-B14F-4D97-AF65-F5344CB8AC3E}">
+        <p14:creationId xmlns:p14="http://schemas.microsoft.com/office/powerpoint/2010/main" val="3104907595"/>
+      </p:ext>
+    </p:extLst>
+  </p:cSld>
+  <p:clrMapOvr>
+    <a:masterClrMapping/>
+  </p:clrMapOvr>
+</p:sld>
+</file>
+
+<file path=ppt/slides/slide7.xml><?xml version="1.0" encoding="utf-8"?>
+<p:sld xmlns:a="http://schemas.openxmlformats.org/drawingml/2006/main" xmlns:r="http://schemas.openxmlformats.org/officeDocument/2006/relationships" xmlns:p="http://schemas.openxmlformats.org/presentationml/2006/main">
+  <p:cSld>
+    <p:spTree>
+      <p:nvGrpSpPr>
+        <p:cNvPr id="1" name=""/>
+        <p:cNvGrpSpPr/>
+        <p:nvPr/>
+      </p:nvGrpSpPr>
+      <p:grpSpPr>
+        <a:xfrm>
+          <a:off x="0" y="0"/>
+          <a:ext cx="0" cy="0"/>
+          <a:chOff x="0" y="0"/>
+          <a:chExt cx="0" cy="0"/>
+        </a:xfrm>
+      </p:grpSpPr>
       <p:sp>
         <p:nvSpPr>
           <p:cNvPr id="2" name="Title 1">
@@ -12281,7 +12738,7 @@
 </p:sld>
 </file>
 
-<file path=ppt/slides/slide7.xml><?xml version="1.0" encoding="utf-8"?>
+<file path=ppt/slides/slide8.xml><?xml version="1.0" encoding="utf-8"?>
 <p:sld xmlns:a="http://schemas.openxmlformats.org/drawingml/2006/main" xmlns:r="http://schemas.openxmlformats.org/officeDocument/2006/relationships" xmlns:p="http://schemas.openxmlformats.org/presentationml/2006/main">
   <p:cSld>
     <p:spTree>
@@ -12333,7 +12790,7 @@
 </p:sld>
 </file>
 
-<file path=ppt/slides/slide8.xml><?xml version="1.0" encoding="utf-8"?>
+<file path=ppt/slides/slide9.xml><?xml version="1.0" encoding="utf-8"?>
 <p:sld xmlns:a="http://schemas.openxmlformats.org/drawingml/2006/main" xmlns:r="http://schemas.openxmlformats.org/officeDocument/2006/relationships" xmlns:p="http://schemas.openxmlformats.org/presentationml/2006/main">
   <p:cSld>
     <p:spTree>
@@ -12418,144 +12875,6 @@
     <p:extLst>
       <p:ext uri="{BB962C8B-B14F-4D97-AF65-F5344CB8AC3E}">
         <p14:creationId xmlns:p14="http://schemas.microsoft.com/office/powerpoint/2010/main" val="518300513"/>
-      </p:ext>
-    </p:extLst>
-  </p:cSld>
-  <p:clrMapOvr>
-    <a:masterClrMapping/>
-  </p:clrMapOvr>
-</p:sld>
-</file>
-
-<file path=ppt/slides/slide9.xml><?xml version="1.0" encoding="utf-8"?>
-<p:sld xmlns:a="http://schemas.openxmlformats.org/drawingml/2006/main" xmlns:r="http://schemas.openxmlformats.org/officeDocument/2006/relationships" xmlns:p="http://schemas.openxmlformats.org/presentationml/2006/main">
-  <p:cSld>
-    <p:spTree>
-      <p:nvGrpSpPr>
-        <p:cNvPr id="1" name=""/>
-        <p:cNvGrpSpPr/>
-        <p:nvPr/>
-      </p:nvGrpSpPr>
-      <p:grpSpPr>
-        <a:xfrm>
-          <a:off x="0" y="0"/>
-          <a:ext cx="0" cy="0"/>
-          <a:chOff x="0" y="0"/>
-          <a:chExt cx="0" cy="0"/>
-        </a:xfrm>
-      </p:grpSpPr>
-      <p:sp>
-        <p:nvSpPr>
-          <p:cNvPr id="2" name="Title 1">
-            <a:extLst>
-              <a:ext uri="{FF2B5EF4-FFF2-40B4-BE49-F238E27FC236}">
-                <a16:creationId xmlns:a16="http://schemas.microsoft.com/office/drawing/2014/main" id="{CF3C901D-5653-4880-971A-32EBDD5A0859}"/>
-              </a:ext>
-            </a:extLst>
-          </p:cNvPr>
-          <p:cNvSpPr>
-            <a:spLocks noGrp="1"/>
-          </p:cNvSpPr>
-          <p:nvPr>
-            <p:ph type="title"/>
-          </p:nvPr>
-        </p:nvSpPr>
-        <p:spPr/>
-        <p:txBody>
-          <a:bodyPr/>
-          <a:lstStyle/>
-          <a:p>
-            <a:r>
-              <a:rPr lang="en-US" dirty="0"/>
-              <a:t>NuGet</a:t>
-            </a:r>
-          </a:p>
-        </p:txBody>
-      </p:sp>
-      <p:sp>
-        <p:nvSpPr>
-          <p:cNvPr id="3" name="Content Placeholder 2">
-            <a:extLst>
-              <a:ext uri="{FF2B5EF4-FFF2-40B4-BE49-F238E27FC236}">
-                <a16:creationId xmlns:a16="http://schemas.microsoft.com/office/drawing/2014/main" id="{ADA832B4-E4C8-48D0-9912-741FC459B9FE}"/>
-              </a:ext>
-            </a:extLst>
-          </p:cNvPr>
-          <p:cNvSpPr>
-            <a:spLocks noGrp="1"/>
-          </p:cNvSpPr>
-          <p:nvPr>
-            <p:ph idx="1"/>
-          </p:nvPr>
-        </p:nvSpPr>
-        <p:spPr/>
-        <p:txBody>
-          <a:bodyPr/>
-          <a:lstStyle/>
-          <a:p>
-            <a:pPr marL="571500" indent="-571500">
-              <a:buFont typeface="Arial" panose="020B0604020202020204" pitchFamily="34" charset="0"/>
-              <a:buChar char="•"/>
-            </a:pPr>
-            <a:r>
-              <a:rPr lang="en-US" dirty="0"/>
-              <a:t>Single ZIP file with the .</a:t>
-            </a:r>
-            <a:r>
-              <a:rPr lang="en-US" dirty="0" err="1"/>
-              <a:t>nupkg</a:t>
-            </a:r>
-            <a:r>
-              <a:rPr lang="en-US" dirty="0"/>
-              <a:t> extension</a:t>
-            </a:r>
-          </a:p>
-          <a:p>
-            <a:pPr marL="571500" indent="-571500">
-              <a:buFont typeface="Arial" panose="020B0604020202020204" pitchFamily="34" charset="0"/>
-              <a:buChar char="•"/>
-            </a:pPr>
-            <a:r>
-              <a:rPr lang="en-US" dirty="0"/>
-              <a:t>Contains any files associated with package</a:t>
-            </a:r>
-          </a:p>
-          <a:p>
-            <a:pPr marL="571500" indent="-571500">
-              <a:buFont typeface="Arial" panose="020B0604020202020204" pitchFamily="34" charset="0"/>
-              <a:buChar char="•"/>
-            </a:pPr>
-            <a:r>
-              <a:rPr lang="en-US" dirty="0"/>
-              <a:t>Descriptive Manifest </a:t>
-            </a:r>
-          </a:p>
-          <a:p>
-            <a:pPr marL="571500" indent="-571500">
-              <a:buFont typeface="Arial" panose="020B0604020202020204" pitchFamily="34" charset="0"/>
-              <a:buChar char="•"/>
-            </a:pPr>
-            <a:r>
-              <a:rPr lang="en-US" dirty="0"/>
-              <a:t>Version Number format must be 1.0.2</a:t>
-            </a:r>
-          </a:p>
-          <a:p>
-            <a:pPr marL="571500" indent="-571500">
-              <a:buFont typeface="Arial" panose="020B0604020202020204" pitchFamily="34" charset="0"/>
-              <a:buChar char="•"/>
-            </a:pPr>
-            <a:endParaRPr lang="en-US" dirty="0"/>
-          </a:p>
-          <a:p>
-            <a:endParaRPr lang="en-US" dirty="0"/>
-          </a:p>
-        </p:txBody>
-      </p:sp>
-    </p:spTree>
-    <p:extLst>
-      <p:ext uri="{BB962C8B-B14F-4D97-AF65-F5344CB8AC3E}">
-        <p14:creationId xmlns:p14="http://schemas.microsoft.com/office/powerpoint/2010/main" val="3892061915"/>
       </p:ext>
     </p:extLst>
   </p:cSld>

</xml_diff>

<commit_message>
Begin moving to Linux Containers
</commit_message>
<xml_diff>
--- a/Automation/EnvironmentAutomation.pptx
+++ b/Automation/EnvironmentAutomation.pptx
@@ -3935,7 +3935,7 @@
           <a:p>
             <a:fld id="{AF914A1E-46E5-4184-BEBF-7A52F35B4545}" type="datetimeFigureOut">
               <a:rPr lang="en-US" smtClean="0"/>
-              <a:t>3/2/2020</a:t>
+              <a:t>10/18/2021</a:t>
             </a:fld>
             <a:endParaRPr lang="en-US" dirty="0"/>
           </a:p>
@@ -5721,7 +5721,7 @@
           <a:graphicData uri="http://schemas.openxmlformats.org/presentationml/2006/ole">
             <mc:AlternateContent xmlns:mc="http://schemas.openxmlformats.org/markup-compatibility/2006">
               <mc:Choice xmlns:v="urn:schemas-microsoft-com:vml" Requires="v">
-                <p:oleObj spid="_x0000_s1145" name="Image" r:id="rId10" imgW="2279520" imgH="1310400" progId="Photoshop.Image.18">
+                <p:oleObj spid="_x0000_s1027" name="Image" r:id="rId10" imgW="2279520" imgH="1310400" progId="Photoshop.Image.18">
                   <p:embed/>
                 </p:oleObj>
               </mc:Choice>
@@ -6198,10 +6198,10 @@
       </p:sp>
       <p:pic>
         <p:nvPicPr>
-          <p:cNvPr id="5" name="Picture 4">
-            <a:extLst>
-              <a:ext uri="{FF2B5EF4-FFF2-40B4-BE49-F238E27FC236}">
-                <a16:creationId xmlns:a16="http://schemas.microsoft.com/office/drawing/2014/main" id="{030E776D-3FEE-46C2-A9CF-80F15B3ED6AF}"/>
+          <p:cNvPr id="4" name="Picture 3">
+            <a:extLst>
+              <a:ext uri="{FF2B5EF4-FFF2-40B4-BE49-F238E27FC236}">
+                <a16:creationId xmlns:a16="http://schemas.microsoft.com/office/drawing/2014/main" id="{171EEBF8-B0CA-44F3-9D52-68A889BD5C80}"/>
               </a:ext>
             </a:extLst>
           </p:cNvPr>
@@ -6218,8 +6218,8 @@
         </p:blipFill>
         <p:spPr>
           <a:xfrm>
-            <a:off x="361038" y="1302611"/>
-            <a:ext cx="7648817" cy="4817201"/>
+            <a:off x="514526" y="1271460"/>
+            <a:ext cx="10199074" cy="4572000"/>
           </a:xfrm>
           <a:prstGeom prst="rect">
             <a:avLst/>
@@ -26079,7 +26079,7 @@
             </a:pPr>
             <a:r>
               <a:rPr lang="en-US" dirty="0"/>
-              <a:t>Short development cycle, long ROI</a:t>
+              <a:t>Short development cycle, quick  return on investment (ROI)</a:t>
             </a:r>
           </a:p>
         </p:txBody>
@@ -28394,7 +28394,7 @@
             </a:pPr>
             <a:r>
               <a:rPr lang="en-US" dirty="0"/>
-              <a:t>Docker Environment </a:t>
+              <a:t>Docker Overview</a:t>
             </a:r>
           </a:p>
           <a:p>
@@ -28416,9 +28416,6 @@
               <a:rPr lang="en-US" dirty="0"/>
               <a:t>PowerShell Automation</a:t>
             </a:r>
-          </a:p>
-          <a:p>
-            <a:endParaRPr lang="en-US" dirty="0"/>
           </a:p>
         </p:txBody>
       </p:sp>
@@ -28507,7 +28504,7 @@
             </a:pPr>
             <a:r>
               <a:rPr lang="en-US" dirty="0"/>
-              <a:t>Docker can be used to create dynamic database environments that can be used for</a:t>
+              <a:t>Powershell is a DBAs best friend and can be used to automate almost anything.</a:t>
             </a:r>
           </a:p>
           <a:p>
@@ -28516,8 +28513,35 @@
               <a:buChar char="•"/>
             </a:pPr>
             <a:r>
+              <a:rPr lang="en-US" dirty="0" err="1"/>
+              <a:t>DBATools</a:t>
+            </a:r>
+            <a:r>
               <a:rPr lang="en-US" dirty="0"/>
-              <a:t>Testing</a:t>
+              <a:t>, </a:t>
+            </a:r>
+            <a:r>
+              <a:rPr lang="en-US" dirty="0" err="1"/>
+              <a:t>SQLServer</a:t>
+            </a:r>
+            <a:r>
+              <a:rPr lang="en-US" dirty="0"/>
+              <a:t>, </a:t>
+            </a:r>
+            <a:r>
+              <a:rPr lang="en-US" dirty="0" err="1"/>
+              <a:t>DBACheck</a:t>
+            </a:r>
+            <a:endParaRPr lang="en-US" dirty="0"/>
+          </a:p>
+          <a:p>
+            <a:pPr marL="571500" indent="-571500">
+              <a:buFont typeface="Arial" panose="020B0604020202020204" pitchFamily="34" charset="0"/>
+              <a:buChar char="•"/>
+            </a:pPr>
+            <a:r>
+              <a:rPr lang="en-US" dirty="0"/>
+              <a:t>Docker can be used to create dynamic database environments that can be used for</a:t>
             </a:r>
           </a:p>
           <a:p>
@@ -28527,7 +28551,27 @@
             </a:pPr>
             <a:r>
               <a:rPr lang="en-US" dirty="0"/>
+              <a:t>Testing</a:t>
+            </a:r>
+          </a:p>
+          <a:p>
+            <a:pPr marL="1147527" lvl="1" indent="-571500">
+              <a:buFont typeface="Arial" panose="020B0604020202020204" pitchFamily="34" charset="0"/>
+              <a:buChar char="•"/>
+            </a:pPr>
+            <a:r>
+              <a:rPr lang="en-US" dirty="0"/>
               <a:t>Development</a:t>
+            </a:r>
+          </a:p>
+          <a:p>
+            <a:pPr marL="1147527" lvl="1" indent="-571500">
+              <a:buFont typeface="Arial" panose="020B0604020202020204" pitchFamily="34" charset="0"/>
+              <a:buChar char="•"/>
+            </a:pPr>
+            <a:r>
+              <a:rPr lang="en-US" dirty="0"/>
+              <a:t>Even Production</a:t>
             </a:r>
           </a:p>
           <a:p>
@@ -31085,17 +31129,17 @@
           <a:p>
             <a:r>
               <a:rPr lang="en-US" dirty="0"/>
-              <a:t>Download SQL Server 2017 Container</a:t>
+              <a:t>Download SQL Server Container</a:t>
             </a:r>
           </a:p>
         </p:txBody>
       </p:sp>
       <p:pic>
         <p:nvPicPr>
-          <p:cNvPr id="4" name="Picture 3">
-            <a:extLst>
-              <a:ext uri="{FF2B5EF4-FFF2-40B4-BE49-F238E27FC236}">
-                <a16:creationId xmlns:a16="http://schemas.microsoft.com/office/drawing/2014/main" id="{F0FADD90-33F1-44DD-AC0C-24F456C5C09A}"/>
+          <p:cNvPr id="6" name="Picture 5">
+            <a:extLst>
+              <a:ext uri="{FF2B5EF4-FFF2-40B4-BE49-F238E27FC236}">
+                <a16:creationId xmlns:a16="http://schemas.microsoft.com/office/drawing/2014/main" id="{5E0F873E-0913-434F-AD34-8E09DB54C3B4}"/>
               </a:ext>
             </a:extLst>
           </p:cNvPr>
@@ -31112,8 +31156,8 @@
         </p:blipFill>
         <p:spPr>
           <a:xfrm>
-            <a:off x="361038" y="2754188"/>
-            <a:ext cx="10415944" cy="1276126"/>
+            <a:off x="412691" y="2141838"/>
+            <a:ext cx="10308612" cy="2117123"/>
           </a:xfrm>
           <a:prstGeom prst="rect">
             <a:avLst/>

</xml_diff>